<commit_message>
Fix bugs due to rename: CMakeLists.txt; Reformat codes
</commit_message>
<xml_diff>
--- a/2021_7_12.pptx
+++ b/2021_7_12.pptx
@@ -321,7 +321,7 @@
             </a:pPr>
             <a:fld id="{2120E8A7-10C0-4A3F-8A5F-C23C99458661}" type="datetimeFigureOut">
               <a:rPr lang="en-US"/>
-              <a:t>5/10/2022</a:t>
+              <a:t>11/21/2022</a:t>
             </a:fld>
             <a:endParaRPr lang="en-US"/>
           </a:p>
@@ -534,7 +534,7 @@
             </a:pPr>
             <a:fld id="{51981E3B-E2FD-4482-B46D-D6CD1BE21990}" type="datetimeFigureOut">
               <a:rPr lang="en-US"/>
-              <a:t>5/10/2022</a:t>
+              <a:t>11/21/2022</a:t>
             </a:fld>
             <a:endParaRPr lang="en-US"/>
           </a:p>
@@ -3919,22 +3919,14 @@
           <a:p>
             <a:r>
               <a:rPr lang="en-US" altLang="zh-CN" dirty="0"/>
-              <a:t>Time-invariant scenario in outdoor (urban) database.</a:t>
+              <a:t>Time-variant scenario in outdoor (urban) database.</a:t>
             </a:r>
           </a:p>
           <a:p>
             <a:pPr lvl="1"/>
             <a:r>
               <a:rPr lang="en-US" altLang="zh-CN" dirty="0"/>
-              <a:t>Winprop does not </a:t>
-            </a:r>
-            <a:r>
-              <a:rPr lang="en-US" altLang="zh-CN"/>
-              <a:t>support time-variant </a:t>
-            </a:r>
-            <a:r>
-              <a:rPr lang="en-US" altLang="zh-CN" dirty="0"/>
-              <a:t>simulations in outdoor database.</a:t>
+              <a:t>Winprop does not support time-variant simulations in outdoor database.</a:t>
             </a:r>
           </a:p>
           <a:p>
@@ -4735,7 +4727,7 @@
           <a:p>
             <a:r>
               <a:rPr lang="en-US" altLang="zh-CN" dirty="0"/>
-              <a:t>Simulation database: indoor_time_invariant.cpp</a:t>
+              <a:t>Simulation database: indoor_time_variant.cpp</a:t>
             </a:r>
             <a:endParaRPr lang="zh-CN" altLang="en-US" dirty="0"/>
           </a:p>
@@ -4935,7 +4927,7 @@
           <a:p>
             <a:r>
               <a:rPr lang="en-US" altLang="zh-CN" dirty="0"/>
-              <a:t>Result: indoor_time_invariant.cpp </a:t>
+              <a:t>Result: indoor_time_variant.cpp </a:t>
             </a:r>
             <a:endParaRPr lang="zh-CN" altLang="en-US" dirty="0"/>
           </a:p>
@@ -5713,7 +5705,7 @@
           <a:p>
             <a:r>
               <a:rPr lang="en-US" altLang="zh-CN" dirty="0"/>
-              <a:t>Result: indoor_time_invariant.cpp</a:t>
+              <a:t>Result: indoor_time_variant.cpp</a:t>
             </a:r>
             <a:r>
               <a:rPr lang="zh-CN" altLang="en-US" dirty="0"/>
@@ -6096,7 +6088,7 @@
         </p:blipFill>
         <p:spPr>
           <a:xfrm>
-            <a:off x="6157375" y="1611809"/>
+            <a:off x="6177545" y="1611809"/>
             <a:ext cx="5196425" cy="3897319"/>
           </a:xfrm>
           <a:prstGeom prst="rect">

</xml_diff>